<commit_message>
Plan de Gestión de Aseguramiento de Calidad
</commit_message>
<xml_diff>
--- a/Area_de_Proceso-_PPQA/PQA/PQA_V1.0_2015.pptx
+++ b/Area_de_Proceso-_PPQA/PQA/PQA_V1.0_2015.pptx
@@ -3745,7 +3745,7 @@
           <a:p>
             <a:fld id="{56F99C03-A70A-4B29-84B2-81DDC41A991A}" type="datetimeFigureOut">
               <a:rPr lang="es-PE" smtClean="0"/>
-              <a:t>19/10/2015</a:t>
+              <a:t>20/10/2015</a:t>
             </a:fld>
             <a:endParaRPr lang="es-PE"/>
           </a:p>
@@ -5465,7 +5465,7 @@
           <a:p>
             <a:fld id="{216C5678-EE20-4FA5-88E2-6E0BD67A2E26}" type="datetime1">
               <a:rPr lang="en-US" smtClean="0"/>
-              <a:t>10/19/2015</a:t>
+              <a:t>10/20/2015</a:t>
             </a:fld>
             <a:endParaRPr lang="en-US" dirty="0"/>
           </a:p>
@@ -5635,7 +5635,7 @@
           <a:p>
             <a:fld id="{EA051B39-B140-43FE-96DB-472A2B59CE7C}" type="datetime1">
               <a:rPr lang="en-US" smtClean="0"/>
-              <a:t>10/19/2015</a:t>
+              <a:t>10/20/2015</a:t>
             </a:fld>
             <a:endParaRPr lang="en-US"/>
           </a:p>
@@ -5815,7 +5815,7 @@
           <a:p>
             <a:fld id="{DA600BB2-27C5-458B-ABCE-839C88CF47CE}" type="datetime1">
               <a:rPr lang="en-US" smtClean="0"/>
-              <a:t>10/19/2015</a:t>
+              <a:t>10/20/2015</a:t>
             </a:fld>
             <a:endParaRPr lang="en-US"/>
           </a:p>
@@ -6003,7 +6003,7 @@
           <a:p>
             <a:fld id="{B11D738E-8962-435F-8C43-147B8DD7E819}" type="datetime1">
               <a:rPr lang="en-US" smtClean="0"/>
-              <a:t>10/19/2015</a:t>
+              <a:t>10/20/2015</a:t>
             </a:fld>
             <a:endParaRPr lang="en-US"/>
           </a:p>
@@ -6270,7 +6270,7 @@
           <a:p>
             <a:fld id="{09CAEA93-55E7-4DA9-90C2-089A26EEFEC4}" type="datetime1">
               <a:rPr lang="en-US" smtClean="0"/>
-              <a:t>10/19/2015</a:t>
+              <a:t>10/20/2015</a:t>
             </a:fld>
             <a:endParaRPr lang="en-US"/>
           </a:p>
@@ -6623,7 +6623,7 @@
           <a:p>
             <a:fld id="{E34CF3C7-6809-4F39-BD67-A75817BDDE0A}" type="datetime1">
               <a:rPr lang="en-US" smtClean="0"/>
-              <a:t>10/19/2015</a:t>
+              <a:t>10/20/2015</a:t>
             </a:fld>
             <a:endParaRPr lang="en-US"/>
           </a:p>
@@ -6936,7 +6936,7 @@
           <a:p>
             <a:fld id="{F7EAEB24-CE78-465C-A726-91D0868FA48F}" type="datetime1">
               <a:rPr lang="en-US" smtClean="0"/>
-              <a:t>10/19/2015</a:t>
+              <a:t>10/20/2015</a:t>
             </a:fld>
             <a:endParaRPr lang="en-US"/>
           </a:p>
@@ -7168,7 +7168,7 @@
           <a:p>
             <a:fld id="{40BAADF0-1749-4E8B-9691-B44A5F8C0895}" type="datetime1">
               <a:rPr lang="en-US" smtClean="0"/>
-              <a:t>10/19/2015</a:t>
+              <a:t>10/20/2015</a:t>
             </a:fld>
             <a:endParaRPr lang="en-US"/>
           </a:p>
@@ -7263,7 +7263,7 @@
           <a:p>
             <a:fld id="{A8AF628A-A867-4937-BBE5-207DB6F9C51A}" type="datetime1">
               <a:rPr lang="en-US" smtClean="0"/>
-              <a:t>10/19/2015</a:t>
+              <a:t>10/20/2015</a:t>
             </a:fld>
             <a:endParaRPr lang="en-US"/>
           </a:p>
@@ -7556,7 +7556,7 @@
           <a:p>
             <a:fld id="{118BBB94-68E6-4675-A946-F1C5994EDBD7}" type="datetime1">
               <a:rPr lang="en-US" smtClean="0"/>
-              <a:t>10/19/2015</a:t>
+              <a:t>10/20/2015</a:t>
             </a:fld>
             <a:endParaRPr lang="en-US"/>
           </a:p>
@@ -7830,7 +7830,7 @@
           <a:p>
             <a:fld id="{DC3B8377-21E3-4835-B75D-4E2847E2750F}" type="datetime1">
               <a:rPr lang="en-US" smtClean="0"/>
-              <a:t>10/19/2015</a:t>
+              <a:t>10/20/2015</a:t>
             </a:fld>
             <a:endParaRPr lang="en-US"/>
           </a:p>
@@ -8045,7 +8045,7 @@
           <a:p>
             <a:fld id="{B0C4986D-6BE9-4264-908F-02DB36FD8D6C}" type="datetime1">
               <a:rPr lang="en-US" smtClean="0"/>
-              <a:t>10/19/2015</a:t>
+              <a:t>10/20/2015</a:t>
             </a:fld>
             <a:endParaRPr lang="en-US" dirty="0"/>
           </a:p>
@@ -8586,7 +8586,7 @@
           <a:p>
             <a:fld id="{216C5678-EE20-4FA5-88E2-6E0BD67A2E26}" type="datetime1">
               <a:rPr lang="en-US" smtClean="0"/>
-              <a:t>10/19/2015</a:t>
+              <a:t>10/20/2015</a:t>
             </a:fld>
             <a:endParaRPr lang="en-US" dirty="0"/>
           </a:p>
@@ -9096,7 +9096,7 @@
           <a:p>
             <a:fld id="{216C5678-EE20-4FA5-88E2-6E0BD67A2E26}" type="datetime1">
               <a:rPr lang="en-US" smtClean="0"/>
-              <a:t>10/19/2015</a:t>
+              <a:t>10/20/2015</a:t>
             </a:fld>
             <a:endParaRPr lang="en-US" dirty="0"/>
           </a:p>
@@ -9609,7 +9609,7 @@
           <a:p>
             <a:fld id="{216C5678-EE20-4FA5-88E2-6E0BD67A2E26}" type="datetime1">
               <a:rPr lang="en-US" smtClean="0"/>
-              <a:t>10/19/2015</a:t>
+              <a:t>10/20/2015</a:t>
             </a:fld>
             <a:endParaRPr lang="en-US" dirty="0"/>
           </a:p>
@@ -9772,7 +9772,7 @@
           <a:p>
             <a:fld id="{216C5678-EE20-4FA5-88E2-6E0BD67A2E26}" type="datetime1">
               <a:rPr lang="en-US" smtClean="0"/>
-              <a:t>10/19/2015</a:t>
+              <a:t>10/20/2015</a:t>
             </a:fld>
             <a:endParaRPr lang="en-US" dirty="0"/>
           </a:p>
@@ -10024,7 +10024,7 @@
           <a:p>
             <a:fld id="{216C5678-EE20-4FA5-88E2-6E0BD67A2E26}" type="datetime1">
               <a:rPr lang="en-US" smtClean="0"/>
-              <a:t>10/19/2015</a:t>
+              <a:t>10/20/2015</a:t>
             </a:fld>
             <a:endParaRPr lang="en-US" dirty="0"/>
           </a:p>
@@ -13450,7 +13450,7 @@
           <a:p>
             <a:fld id="{216C5678-EE20-4FA5-88E2-6E0BD67A2E26}" type="datetime1">
               <a:rPr lang="en-US" smtClean="0"/>
-              <a:t>10/19/2015</a:t>
+              <a:t>10/20/2015</a:t>
             </a:fld>
             <a:endParaRPr lang="en-US" dirty="0"/>
           </a:p>
@@ -13785,7 +13785,7 @@
           <a:p>
             <a:fld id="{216C5678-EE20-4FA5-88E2-6E0BD67A2E26}" type="datetime1">
               <a:rPr lang="en-US" smtClean="0"/>
-              <a:t>10/19/2015</a:t>
+              <a:t>10/20/2015</a:t>
             </a:fld>
             <a:endParaRPr lang="en-US" dirty="0"/>
           </a:p>
@@ -13948,10 +13948,10 @@
         </p:nvGrpSpPr>
         <p:grpSpPr>
           <a:xfrm>
-            <a:off x="167213" y="2463009"/>
-            <a:ext cx="8900498" cy="3936210"/>
-            <a:chOff x="356890" y="2235694"/>
-            <a:chExt cx="11094214" cy="3936210"/>
+            <a:off x="167213" y="2463010"/>
+            <a:ext cx="8900498" cy="3936209"/>
+            <a:chOff x="356890" y="2235695"/>
+            <a:chExt cx="11094214" cy="3936209"/>
           </a:xfrm>
         </p:grpSpPr>
         <p:cxnSp>
@@ -14000,10 +14000,10 @@
           </p:nvGrpSpPr>
           <p:grpSpPr bwMode="auto">
             <a:xfrm>
-              <a:off x="3335637" y="2246195"/>
-              <a:ext cx="1861908" cy="2318565"/>
+              <a:off x="3335637" y="2246196"/>
+              <a:ext cx="1861908" cy="2472188"/>
               <a:chOff x="818" y="1517"/>
-              <a:chExt cx="745" cy="815"/>
+              <a:chExt cx="745" cy="869"/>
             </a:xfrm>
           </p:grpSpPr>
           <p:sp>
@@ -14229,7 +14229,7 @@
             <p:spPr bwMode="auto">
               <a:xfrm>
                 <a:off x="818" y="2071"/>
-                <a:ext cx="745" cy="261"/>
+                <a:ext cx="745" cy="315"/>
               </a:xfrm>
               <a:prstGeom prst="rect">
                 <a:avLst/>
@@ -14257,20 +14257,14 @@
               <a:p>
                 <a:pPr marL="93663" algn="ctr"/>
                 <a:r>
-                  <a:rPr lang="es-ES" altLang="es-PE" sz="1200" b="1" dirty="0" smtClean="0">
+                  <a:rPr lang="es-PE" altLang="es-PE" sz="1200" b="1" dirty="0">
                     <a:solidFill>
                       <a:schemeClr val="bg1"/>
                     </a:solidFill>
                     <a:latin typeface="Arial" panose="020B0604020202020204" pitchFamily="34" charset="0"/>
                   </a:rPr>
-                  <a:t>Herramienta Gestión QA-Producto</a:t>
+                  <a:t>HGQA Herramienta de Gestión Aseguramiento de Calidad</a:t>
                 </a:r>
-                <a:endParaRPr lang="es-PE" altLang="es-PE" sz="1200" b="1" dirty="0">
-                  <a:solidFill>
-                    <a:schemeClr val="bg1"/>
-                  </a:solidFill>
-                  <a:latin typeface="Arial" panose="020B0604020202020204" pitchFamily="34" charset="0"/>
-                </a:endParaRPr>
               </a:p>
             </p:txBody>
           </p:sp>
@@ -14357,10 +14351,10 @@
           </p:nvGrpSpPr>
           <p:grpSpPr bwMode="auto">
             <a:xfrm>
-              <a:off x="5775146" y="2235694"/>
-              <a:ext cx="1956122" cy="2335374"/>
+              <a:off x="5775146" y="2235695"/>
+              <a:ext cx="1956122" cy="2482901"/>
               <a:chOff x="2469" y="1506"/>
-              <a:chExt cx="723" cy="839"/>
+              <a:chExt cx="723" cy="892"/>
             </a:xfrm>
           </p:grpSpPr>
           <p:sp>
@@ -14679,7 +14673,7 @@
             <p:spPr bwMode="auto">
               <a:xfrm>
                 <a:off x="2469" y="2076"/>
-                <a:ext cx="723" cy="269"/>
+                <a:ext cx="723" cy="322"/>
               </a:xfrm>
               <a:prstGeom prst="rect">
                 <a:avLst/>
@@ -14707,20 +14701,14 @@
               <a:p>
                 <a:pPr marL="93663" algn="ctr"/>
                 <a:r>
-                  <a:rPr lang="es-ES" altLang="es-PE" sz="1200" b="1" dirty="0">
+                  <a:rPr lang="es-PE" altLang="es-PE" sz="1200" b="1" dirty="0">
                     <a:solidFill>
                       <a:schemeClr val="bg1"/>
                     </a:solidFill>
                     <a:latin typeface="Arial" panose="020B0604020202020204" pitchFamily="34" charset="0"/>
                   </a:rPr>
-                  <a:t>Herramienta Gestión QA-Producto</a:t>
+                  <a:t>HGQA Herramienta de Gestión Aseguramiento de Calidad</a:t>
                 </a:r>
-                <a:endParaRPr lang="es-PE" altLang="es-PE" sz="1200" b="1" dirty="0">
-                  <a:solidFill>
-                    <a:schemeClr val="bg1"/>
-                  </a:solidFill>
-                  <a:latin typeface="Arial" panose="020B0604020202020204" pitchFamily="34" charset="0"/>
-                </a:endParaRPr>
               </a:p>
             </p:txBody>
           </p:sp>
@@ -15906,7 +15894,7 @@
           <p:nvPr>
             <p:extLst>
               <p:ext uri="{D42A27DB-BD31-4B8C-83A1-F6EECF244321}">
-                <p14:modId xmlns:p14="http://schemas.microsoft.com/office/powerpoint/2010/main" val="217858970"/>
+                <p14:modId xmlns:p14="http://schemas.microsoft.com/office/powerpoint/2010/main" val="3347867377"/>
               </p:ext>
             </p:extLst>
           </p:nvPr>
@@ -16462,7 +16450,40 @@
                           <a:ea typeface="Verdana" panose="020B0604030504040204" pitchFamily="34" charset="0"/>
                           <a:cs typeface="Verdana" panose="020B0604030504040204" pitchFamily="34" charset="0"/>
                         </a:rPr>
-                        <a:t>Herramienta de Gestión QA-Producto</a:t>
+                        <a:t>HGQA</a:t>
+                      </a:r>
+                      <a:r>
+                        <a:rPr lang="es-PE" sz="1200" kern="1200" baseline="0" dirty="0" smtClean="0">
+                          <a:solidFill>
+                            <a:schemeClr val="dk1"/>
+                          </a:solidFill>
+                          <a:latin typeface="+mj-lt"/>
+                          <a:ea typeface="Verdana" panose="020B0604030504040204" pitchFamily="34" charset="0"/>
+                          <a:cs typeface="Verdana" panose="020B0604030504040204" pitchFamily="34" charset="0"/>
+                        </a:rPr>
+                        <a:t> </a:t>
+                      </a:r>
+                      <a:r>
+                        <a:rPr lang="es-PE" sz="1200" kern="1200" dirty="0" smtClean="0">
+                          <a:solidFill>
+                            <a:schemeClr val="dk1"/>
+                          </a:solidFill>
+                          <a:latin typeface="+mj-lt"/>
+                          <a:ea typeface="Verdana" panose="020B0604030504040204" pitchFamily="34" charset="0"/>
+                          <a:cs typeface="Verdana" panose="020B0604030504040204" pitchFamily="34" charset="0"/>
+                        </a:rPr>
+                        <a:t>Herramienta de Gestión Aseguramiento</a:t>
+                      </a:r>
+                      <a:r>
+                        <a:rPr lang="es-PE" sz="1200" kern="1200" baseline="0" dirty="0" smtClean="0">
+                          <a:solidFill>
+                            <a:schemeClr val="dk1"/>
+                          </a:solidFill>
+                          <a:latin typeface="+mj-lt"/>
+                          <a:ea typeface="Verdana" panose="020B0604030504040204" pitchFamily="34" charset="0"/>
+                          <a:cs typeface="Verdana" panose="020B0604030504040204" pitchFamily="34" charset="0"/>
+                        </a:rPr>
+                        <a:t> de Calidad</a:t>
                       </a:r>
                       <a:endParaRPr lang="es-ES" sz="1200" kern="1200" dirty="0" smtClean="0">
                         <a:solidFill>
@@ -16735,16 +16756,8 @@
                           <a:ea typeface="Verdana" panose="020B0604030504040204" pitchFamily="34" charset="0"/>
                           <a:cs typeface="Verdana" panose="020B0604030504040204" pitchFamily="34" charset="0"/>
                         </a:rPr>
-                        <a:t>Herramienta de Gestión QA-Producto</a:t>
+                        <a:t>HGQA Herramienta de Gestión Aseguramiento de Calidad</a:t>
                       </a:r>
-                      <a:endParaRPr lang="es-ES" sz="1200" kern="1200" dirty="0" smtClean="0">
-                        <a:solidFill>
-                          <a:schemeClr val="dk1"/>
-                        </a:solidFill>
-                        <a:latin typeface="+mj-lt"/>
-                        <a:ea typeface="Verdana" panose="020B0604030504040204" pitchFamily="34" charset="0"/>
-                        <a:cs typeface="Verdana" panose="020B0604030504040204" pitchFamily="34" charset="0"/>
-                      </a:endParaRPr>
                     </a:p>
                   </a:txBody>
                   <a:tcPr marT="45703" marB="45703" anchor="ctr" horzOverflow="overflow"/>
@@ -16803,7 +16816,7 @@
           <a:p>
             <a:fld id="{216C5678-EE20-4FA5-88E2-6E0BD67A2E26}" type="datetime1">
               <a:rPr lang="en-US" smtClean="0"/>
-              <a:t>10/19/2015</a:t>
+              <a:t>10/20/2015</a:t>
             </a:fld>
             <a:endParaRPr lang="en-US" dirty="0"/>
           </a:p>
@@ -17140,7 +17153,7 @@
           <a:p>
             <a:fld id="{216C5678-EE20-4FA5-88E2-6E0BD67A2E26}" type="datetime1">
               <a:rPr lang="en-US" smtClean="0"/>
-              <a:t>10/19/2015</a:t>
+              <a:t>10/20/2015</a:t>
             </a:fld>
             <a:endParaRPr lang="en-US" dirty="0"/>
           </a:p>
@@ -17373,7 +17386,7 @@
           <a:p>
             <a:fld id="{216C5678-EE20-4FA5-88E2-6E0BD67A2E26}" type="datetime1">
               <a:rPr lang="en-US" smtClean="0"/>
-              <a:t>10/19/2015</a:t>
+              <a:t>10/20/2015</a:t>
             </a:fld>
             <a:endParaRPr lang="en-US" dirty="0"/>
           </a:p>
@@ -21888,14 +21901,14 @@
           <p:nvPr>
             <p:extLst>
               <p:ext uri="{D42A27DB-BD31-4B8C-83A1-F6EECF244321}">
-                <p14:modId xmlns:p14="http://schemas.microsoft.com/office/powerpoint/2010/main" val="2760801753"/>
+                <p14:modId xmlns:p14="http://schemas.microsoft.com/office/powerpoint/2010/main" val="2211260513"/>
               </p:ext>
             </p:extLst>
           </p:nvPr>
         </p:nvGraphicFramePr>
         <p:xfrm>
           <a:off x="179512" y="332656"/>
-          <a:ext cx="8886771" cy="5724024"/>
+          <a:ext cx="8886771" cy="5906904"/>
         </p:xfrm>
         <a:graphic>
           <a:graphicData uri="http://schemas.openxmlformats.org/drawingml/2006/table">
@@ -22576,7 +22589,51 @@
                           <a:ea typeface="Verdana" panose="020B0604030504040204" pitchFamily="34" charset="0"/>
                           <a:cs typeface="Verdana" panose="020B0604030504040204" pitchFamily="34" charset="0"/>
                         </a:rPr>
-                        <a:t>Solicitud de QA (documentos especificados)</a:t>
+                        <a:t>SOLQA</a:t>
+                      </a:r>
+                      <a:r>
+                        <a:rPr lang="es-PE" sz="1200" kern="1200" baseline="0" dirty="0" smtClean="0">
+                          <a:solidFill>
+                            <a:schemeClr val="dk1"/>
+                          </a:solidFill>
+                          <a:latin typeface="+mj-lt"/>
+                          <a:ea typeface="Verdana" panose="020B0604030504040204" pitchFamily="34" charset="0"/>
+                          <a:cs typeface="Verdana" panose="020B0604030504040204" pitchFamily="34" charset="0"/>
+                        </a:rPr>
+                        <a:t> </a:t>
+                      </a:r>
+                      <a:r>
+                        <a:rPr lang="es-PE" sz="1200" kern="1200" dirty="0" smtClean="0">
+                          <a:solidFill>
+                            <a:schemeClr val="dk1"/>
+                          </a:solidFill>
+                          <a:latin typeface="+mj-lt"/>
+                          <a:ea typeface="Verdana" panose="020B0604030504040204" pitchFamily="34" charset="0"/>
+                          <a:cs typeface="Verdana" panose="020B0604030504040204" pitchFamily="34" charset="0"/>
+                        </a:rPr>
+                        <a:t>Solicitud de</a:t>
+                      </a:r>
+                      <a:r>
+                        <a:rPr lang="es-PE" sz="1200" kern="1200" baseline="0" dirty="0" smtClean="0">
+                          <a:solidFill>
+                            <a:schemeClr val="dk1"/>
+                          </a:solidFill>
+                          <a:latin typeface="+mj-lt"/>
+                          <a:ea typeface="Verdana" panose="020B0604030504040204" pitchFamily="34" charset="0"/>
+                          <a:cs typeface="Verdana" panose="020B0604030504040204" pitchFamily="34" charset="0"/>
+                        </a:rPr>
+                        <a:t> Aseguramiento de Calidad</a:t>
+                      </a:r>
+                      <a:r>
+                        <a:rPr lang="es-PE" sz="1200" kern="1200" dirty="0" smtClean="0">
+                          <a:solidFill>
+                            <a:schemeClr val="dk1"/>
+                          </a:solidFill>
+                          <a:latin typeface="+mj-lt"/>
+                          <a:ea typeface="Verdana" panose="020B0604030504040204" pitchFamily="34" charset="0"/>
+                          <a:cs typeface="Verdana" panose="020B0604030504040204" pitchFamily="34" charset="0"/>
+                        </a:rPr>
+                        <a:t> (Documentos especificados)</a:t>
                       </a:r>
                     </a:p>
                   </a:txBody>
@@ -22818,16 +22875,8 @@
                           <a:ea typeface="Verdana" panose="020B0604030504040204" pitchFamily="34" charset="0"/>
                           <a:cs typeface="Verdana" panose="020B0604030504040204" pitchFamily="34" charset="0"/>
                         </a:rPr>
-                        <a:t>Herramienta de Gestión QA-Producto</a:t>
+                        <a:t>HGQA Herramienta de Gestión Aseguramiento de Calidad</a:t>
                       </a:r>
-                      <a:endParaRPr lang="es-ES" sz="1200" kern="1200" dirty="0" smtClean="0">
-                        <a:solidFill>
-                          <a:schemeClr val="dk1"/>
-                        </a:solidFill>
-                        <a:latin typeface="+mj-lt"/>
-                        <a:ea typeface="Verdana" panose="020B0604030504040204" pitchFamily="34" charset="0"/>
-                        <a:cs typeface="Verdana" panose="020B0604030504040204" pitchFamily="34" charset="0"/>
-                      </a:endParaRPr>
                     </a:p>
                   </a:txBody>
                   <a:tcPr marL="91437" marR="91437" marT="45702" marB="45702" anchor="ctr" horzOverflow="overflow"/>
@@ -23207,16 +23256,8 @@
                           <a:ea typeface="Verdana" panose="020B0604030504040204" pitchFamily="34" charset="0"/>
                           <a:cs typeface="Verdana" panose="020B0604030504040204" pitchFamily="34" charset="0"/>
                         </a:rPr>
-                        <a:t>Herramienta de Gestión QA-Producto</a:t>
+                        <a:t>HGQA Herramienta de Gestión Aseguramiento de Calidad</a:t>
                       </a:r>
-                      <a:endParaRPr lang="es-ES" sz="1200" kern="1200" dirty="0" smtClean="0">
-                        <a:solidFill>
-                          <a:schemeClr val="dk1"/>
-                        </a:solidFill>
-                        <a:latin typeface="+mj-lt"/>
-                        <a:ea typeface="Verdana" panose="020B0604030504040204" pitchFamily="34" charset="0"/>
-                        <a:cs typeface="Verdana" panose="020B0604030504040204" pitchFamily="34" charset="0"/>
-                      </a:endParaRPr>
                     </a:p>
                   </a:txBody>
                   <a:tcPr marL="91437" marR="91437" marT="45714" marB="45714" anchor="ctr" horzOverflow="overflow"/>
@@ -23321,7 +23362,7 @@
           <a:p>
             <a:fld id="{216C5678-EE20-4FA5-88E2-6E0BD67A2E26}" type="datetime1">
               <a:rPr lang="en-US" smtClean="0"/>
-              <a:t>10/19/2015</a:t>
+              <a:t>10/20/2015</a:t>
             </a:fld>
             <a:endParaRPr lang="en-US" dirty="0"/>
           </a:p>
@@ -23546,7 +23587,7 @@
           <p:nvPr>
             <p:extLst>
               <p:ext uri="{D42A27DB-BD31-4B8C-83A1-F6EECF244321}">
-                <p14:modId xmlns:p14="http://schemas.microsoft.com/office/powerpoint/2010/main" val="1882629981"/>
+                <p14:modId xmlns:p14="http://schemas.microsoft.com/office/powerpoint/2010/main" val="4288241624"/>
               </p:ext>
             </p:extLst>
           </p:nvPr>
@@ -23894,7 +23935,7 @@
                           <a:ea typeface="Verdana" panose="020B0604030504040204" pitchFamily="34" charset="0"/>
                           <a:cs typeface="Verdana" panose="020B0604030504040204" pitchFamily="34" charset="0"/>
                         </a:rPr>
-                        <a:t>Checklist de Aseguramiento de Calidad</a:t>
+                        <a:t>CHKQA CheckList de Aseguramiento de Calidad</a:t>
                       </a:r>
                       <a:endParaRPr lang="es-ES" sz="1200" kern="1200" dirty="0" smtClean="0">
                         <a:solidFill>
@@ -24143,9 +24184,10 @@
           <a:lstStyle/>
           <a:p>
             <a:r>
-              <a:rPr lang="en-US" dirty="0"/>
-              <a:t>PGPROY_V1.0_2015</a:t>
+              <a:rPr lang="en-US" dirty="0" smtClean="0"/>
+              <a:t>PQA_V1.0_2015</a:t>
             </a:r>
+            <a:endParaRPr lang="en-US" dirty="0"/>
           </a:p>
         </p:txBody>
       </p:sp>
@@ -24171,7 +24213,7 @@
           <a:p>
             <a:fld id="{216C5678-EE20-4FA5-88E2-6E0BD67A2E26}" type="datetime1">
               <a:rPr lang="en-US" smtClean="0"/>
-              <a:t>10/19/2015</a:t>
+              <a:t>10/20/2015</a:t>
             </a:fld>
             <a:endParaRPr lang="en-US" dirty="0"/>
           </a:p>
@@ -24508,7 +24550,7 @@
           <a:p>
             <a:fld id="{216C5678-EE20-4FA5-88E2-6E0BD67A2E26}" type="datetime1">
               <a:rPr lang="en-US" smtClean="0"/>
-              <a:t>10/19/2015</a:t>
+              <a:t>10/20/2015</a:t>
             </a:fld>
             <a:endParaRPr lang="en-US" dirty="0"/>
           </a:p>
@@ -24559,9 +24601,10 @@
           <a:lstStyle/>
           <a:p>
             <a:r>
-              <a:rPr lang="en-US" dirty="0"/>
-              <a:t>PGPROY_V1.0_2015</a:t>
+              <a:rPr lang="en-US" dirty="0" smtClean="0"/>
+              <a:t>PQA_V1.0_2015</a:t>
             </a:r>
+            <a:endParaRPr lang="en-US" dirty="0"/>
           </a:p>
         </p:txBody>
       </p:sp>
@@ -24671,10 +24714,10 @@
         </p:nvGrpSpPr>
         <p:grpSpPr>
           <a:xfrm>
-            <a:off x="167213" y="2463009"/>
-            <a:ext cx="8900498" cy="3816114"/>
-            <a:chOff x="356890" y="2235694"/>
-            <a:chExt cx="11094214" cy="3816114"/>
+            <a:off x="167213" y="2463010"/>
+            <a:ext cx="8900498" cy="3816113"/>
+            <a:chOff x="356890" y="2235695"/>
+            <a:chExt cx="11094214" cy="3816113"/>
           </a:xfrm>
         </p:grpSpPr>
         <p:cxnSp>
@@ -24723,10 +24766,10 @@
           </p:nvGrpSpPr>
           <p:grpSpPr bwMode="auto">
             <a:xfrm>
-              <a:off x="3335637" y="2246195"/>
-              <a:ext cx="1861908" cy="2318565"/>
+              <a:off x="3335637" y="2246196"/>
+              <a:ext cx="1861908" cy="2472188"/>
               <a:chOff x="818" y="1517"/>
-              <a:chExt cx="745" cy="815"/>
+              <a:chExt cx="745" cy="869"/>
             </a:xfrm>
           </p:grpSpPr>
           <p:sp>
@@ -24865,7 +24908,7 @@
                 <a:pPr algn="ctr" eaLnBrk="1" hangingPunct="1"/>
                 <a:r>
                   <a:rPr lang="es-ES" altLang="es-PE" sz="1300" b="1" dirty="0" smtClean="0"/>
-                  <a:t>Elaborar el Informe Gerencial de QA</a:t>
+                  <a:t>Elaborar el Informe de Revisión General de Aseguramiento de Calidad</a:t>
                 </a:r>
                 <a:endParaRPr lang="es-ES" altLang="es-PE" sz="1300" b="1" dirty="0"/>
               </a:p>
@@ -24947,7 +24990,7 @@
             <p:spPr bwMode="auto">
               <a:xfrm>
                 <a:off x="818" y="2071"/>
-                <a:ext cx="745" cy="261"/>
+                <a:ext cx="745" cy="315"/>
               </a:xfrm>
               <a:prstGeom prst="rect">
                 <a:avLst/>
@@ -24975,20 +25018,14 @@
               <a:p>
                 <a:pPr marL="93663" algn="ctr"/>
                 <a:r>
-                  <a:rPr lang="es-ES" altLang="es-PE" sz="1200" b="1" dirty="0" smtClean="0">
+                  <a:rPr lang="es-PE" altLang="es-PE" sz="1200" b="1" dirty="0">
                     <a:solidFill>
                       <a:schemeClr val="bg1"/>
                     </a:solidFill>
                     <a:latin typeface="Arial" panose="020B0604020202020204" pitchFamily="34" charset="0"/>
                   </a:rPr>
-                  <a:t>Herramienta Gestión QA-Producto</a:t>
+                  <a:t>HGQA Herramienta de Gestión Aseguramiento de Calidad</a:t>
                 </a:r>
-                <a:endParaRPr lang="es-PE" altLang="es-PE" sz="1200" b="1" dirty="0">
-                  <a:solidFill>
-                    <a:schemeClr val="bg1"/>
-                  </a:solidFill>
-                  <a:latin typeface="Arial" panose="020B0604020202020204" pitchFamily="34" charset="0"/>
-                </a:endParaRPr>
               </a:p>
             </p:txBody>
           </p:sp>
@@ -25075,10 +25112,10 @@
           </p:nvGrpSpPr>
           <p:grpSpPr bwMode="auto">
             <a:xfrm>
-              <a:off x="5775146" y="2235694"/>
-              <a:ext cx="1956122" cy="2335374"/>
+              <a:off x="5775146" y="2235695"/>
+              <a:ext cx="1956122" cy="2482901"/>
               <a:chOff x="2469" y="1506"/>
-              <a:chExt cx="723" cy="839"/>
+              <a:chExt cx="723" cy="892"/>
             </a:xfrm>
           </p:grpSpPr>
           <p:sp>
@@ -25397,7 +25434,7 @@
             <p:spPr bwMode="auto">
               <a:xfrm>
                 <a:off x="2469" y="2076"/>
-                <a:ext cx="723" cy="269"/>
+                <a:ext cx="723" cy="322"/>
               </a:xfrm>
               <a:prstGeom prst="rect">
                 <a:avLst/>
@@ -25425,20 +25462,14 @@
               <a:p>
                 <a:pPr marL="93663" algn="ctr"/>
                 <a:r>
-                  <a:rPr lang="es-ES" altLang="es-PE" sz="1200" b="1" dirty="0">
+                  <a:rPr lang="es-PE" altLang="es-PE" sz="1200" b="1" dirty="0">
                     <a:solidFill>
                       <a:schemeClr val="bg1"/>
                     </a:solidFill>
                     <a:latin typeface="Arial" panose="020B0604020202020204" pitchFamily="34" charset="0"/>
                   </a:rPr>
-                  <a:t>Herramienta Gestión QA-Producto</a:t>
+                  <a:t>HGQA Herramienta de Gestión Aseguramiento de Calidad</a:t>
                 </a:r>
-                <a:endParaRPr lang="es-PE" altLang="es-PE" sz="1200" b="1" dirty="0">
-                  <a:solidFill>
-                    <a:schemeClr val="bg1"/>
-                  </a:solidFill>
-                  <a:latin typeface="Arial" panose="020B0604020202020204" pitchFamily="34" charset="0"/>
-                </a:endParaRPr>
               </a:p>
             </p:txBody>
           </p:sp>
@@ -26624,7 +26655,7 @@
           <p:nvPr>
             <p:extLst>
               <p:ext uri="{D42A27DB-BD31-4B8C-83A1-F6EECF244321}">
-                <p14:modId xmlns:p14="http://schemas.microsoft.com/office/powerpoint/2010/main" val="1229540559"/>
+                <p14:modId xmlns:p14="http://schemas.microsoft.com/office/powerpoint/2010/main" val="2769401743"/>
               </p:ext>
             </p:extLst>
           </p:nvPr>
@@ -27151,16 +27182,8 @@
                           <a:ea typeface="Verdana" panose="020B0604030504040204" pitchFamily="34" charset="0"/>
                           <a:cs typeface="Verdana" panose="020B0604030504040204" pitchFamily="34" charset="0"/>
                         </a:rPr>
-                        <a:t>Herramienta de Gestión QA-Producto</a:t>
+                        <a:t>HGQA Herramienta de Gestión Aseguramiento de Calidad</a:t>
                       </a:r>
-                      <a:endParaRPr lang="es-ES" sz="1200" kern="1200" dirty="0" smtClean="0">
-                        <a:solidFill>
-                          <a:schemeClr val="dk1"/>
-                        </a:solidFill>
-                        <a:latin typeface="+mj-lt"/>
-                        <a:ea typeface="Verdana" panose="020B0604030504040204" pitchFamily="34" charset="0"/>
-                        <a:cs typeface="Verdana" panose="020B0604030504040204" pitchFamily="34" charset="0"/>
-                      </a:endParaRPr>
                     </a:p>
                   </a:txBody>
                   <a:tcPr marT="45713" marB="45713" anchor="ctr" horzOverflow="overflow"/>
@@ -27187,7 +27210,7 @@
                         <a:tabLst/>
                       </a:pPr>
                       <a:r>
-                        <a:rPr lang="es-ES_tradnl" sz="1200" kern="1200" dirty="0" smtClean="0">
+                        <a:rPr lang="es-PE" sz="1200" kern="1200" dirty="0" smtClean="0">
                           <a:solidFill>
                             <a:schemeClr val="dk1"/>
                           </a:solidFill>
@@ -27195,7 +27218,7 @@
                           <a:ea typeface="Verdana" panose="020B0604030504040204" pitchFamily="34" charset="0"/>
                           <a:cs typeface="Verdana" panose="020B0604030504040204" pitchFamily="34" charset="0"/>
                         </a:rPr>
-                        <a:t>Informe Gerencial de QA</a:t>
+                        <a:t>Informe de Revisión General de Aseguramiento de Calidad</a:t>
                       </a:r>
                       <a:endParaRPr lang="es-ES" sz="1200" kern="1200" dirty="0" smtClean="0">
                         <a:solidFill>
@@ -27446,16 +27469,8 @@
                           <a:ea typeface="Verdana" panose="020B0604030504040204" pitchFamily="34" charset="0"/>
                           <a:cs typeface="Verdana" panose="020B0604030504040204" pitchFamily="34" charset="0"/>
                         </a:rPr>
-                        <a:t>Herramienta de Gestión QA-Producto</a:t>
+                        <a:t>HGQA Herramienta de Gestión Aseguramiento de Calidad</a:t>
                       </a:r>
-                      <a:endParaRPr lang="es-ES" sz="1200" kern="1200" dirty="0" smtClean="0">
-                        <a:solidFill>
-                          <a:schemeClr val="dk1"/>
-                        </a:solidFill>
-                        <a:latin typeface="+mj-lt"/>
-                        <a:ea typeface="Verdana" panose="020B0604030504040204" pitchFamily="34" charset="0"/>
-                        <a:cs typeface="Verdana" panose="020B0604030504040204" pitchFamily="34" charset="0"/>
-                      </a:endParaRPr>
                     </a:p>
                   </a:txBody>
                   <a:tcPr anchor="ctr" horzOverflow="overflow"/>
@@ -27490,7 +27505,18 @@
                           <a:ea typeface="Verdana" panose="020B0604030504040204" pitchFamily="34" charset="0"/>
                           <a:cs typeface="Verdana" panose="020B0604030504040204" pitchFamily="34" charset="0"/>
                         </a:rPr>
-                        <a:t>Resultados de QA</a:t>
+                        <a:t>Resultados de Aseguramiento</a:t>
+                      </a:r>
+                      <a:r>
+                        <a:rPr lang="es-ES_tradnl" sz="1200" kern="1200" baseline="0" dirty="0" smtClean="0">
+                          <a:solidFill>
+                            <a:schemeClr val="dk1"/>
+                          </a:solidFill>
+                          <a:latin typeface="+mj-lt"/>
+                          <a:ea typeface="Verdana" panose="020B0604030504040204" pitchFamily="34" charset="0"/>
+                          <a:cs typeface="Verdana" panose="020B0604030504040204" pitchFamily="34" charset="0"/>
+                        </a:rPr>
+                        <a:t> de Calidad</a:t>
                       </a:r>
                       <a:endParaRPr lang="es-ES" sz="1200" kern="1200" dirty="0" smtClean="0">
                         <a:solidFill>
@@ -27530,9 +27556,10 @@
           <a:lstStyle/>
           <a:p>
             <a:r>
-              <a:rPr lang="en-US" dirty="0"/>
-              <a:t>PGPROY_V1.0_2015</a:t>
+              <a:rPr lang="en-US" dirty="0" smtClean="0"/>
+              <a:t>PQA_V1.0_2015</a:t>
             </a:r>
+            <a:endParaRPr lang="en-US" dirty="0"/>
           </a:p>
         </p:txBody>
       </p:sp>
@@ -27693,7 +27720,7 @@
           <a:p>
             <a:fld id="{216C5678-EE20-4FA5-88E2-6E0BD67A2E26}" type="datetime1">
               <a:rPr lang="en-US" smtClean="0"/>
-              <a:t>10/19/2015</a:t>
+              <a:t>10/20/2015</a:t>
             </a:fld>
             <a:endParaRPr lang="en-US" dirty="0"/>
           </a:p>
@@ -27744,9 +27771,10 @@
           <a:lstStyle/>
           <a:p>
             <a:r>
-              <a:rPr lang="en-US" dirty="0"/>
-              <a:t>PGPROY_V1.0_2015</a:t>
+              <a:rPr lang="en-US" dirty="0" smtClean="0"/>
+              <a:t>PQA_V1.0_2015</a:t>
             </a:r>
+            <a:endParaRPr lang="en-US" dirty="0"/>
           </a:p>
         </p:txBody>
       </p:sp>
@@ -27943,9 +27971,10 @@
           <a:lstStyle/>
           <a:p>
             <a:r>
-              <a:rPr lang="en-US" dirty="0"/>
-              <a:t>PGPROY_V1.0_2015</a:t>
+              <a:rPr lang="en-US" dirty="0" smtClean="0"/>
+              <a:t>PQA_V1.0_2015</a:t>
             </a:r>
+            <a:endParaRPr lang="en-US" dirty="0"/>
           </a:p>
         </p:txBody>
       </p:sp>
@@ -27971,7 +28000,7 @@
           <a:p>
             <a:fld id="{216C5678-EE20-4FA5-88E2-6E0BD67A2E26}" type="datetime1">
               <a:rPr lang="en-US" smtClean="0"/>
-              <a:t>10/19/2015</a:t>
+              <a:t>10/20/2015</a:t>
             </a:fld>
             <a:endParaRPr lang="en-US" dirty="0"/>
           </a:p>
@@ -28192,7 +28221,7 @@
           <a:p>
             <a:fld id="{216C5678-EE20-4FA5-88E2-6E0BD67A2E26}" type="datetime1">
               <a:rPr lang="en-US" smtClean="0"/>
-              <a:t>10/19/2015</a:t>
+              <a:t>10/20/2015</a:t>
             </a:fld>
             <a:endParaRPr lang="en-US" dirty="0"/>
           </a:p>
@@ -28243,9 +28272,10 @@
           <a:lstStyle/>
           <a:p>
             <a:r>
-              <a:rPr lang="en-US" dirty="0"/>
-              <a:t>PGPROY_V1.0_2015</a:t>
+              <a:rPr lang="en-US" dirty="0" smtClean="0"/>
+              <a:t>PQA_V1.0_2015</a:t>
             </a:r>
+            <a:endParaRPr lang="en-US" dirty="0"/>
           </a:p>
         </p:txBody>
       </p:sp>
@@ -28368,9 +28398,10 @@
           <a:lstStyle/>
           <a:p>
             <a:r>
-              <a:rPr lang="en-US" dirty="0"/>
-              <a:t>PGPROY_V1.0_2015</a:t>
+              <a:rPr lang="en-US" dirty="0" smtClean="0"/>
+              <a:t>PQA_V1.0_2015</a:t>
             </a:r>
+            <a:endParaRPr lang="en-US" dirty="0"/>
           </a:p>
         </p:txBody>
       </p:sp>
@@ -28383,7 +28414,7 @@
           <p:nvPr>
             <p:extLst>
               <p:ext uri="{D42A27DB-BD31-4B8C-83A1-F6EECF244321}">
-                <p14:modId xmlns:p14="http://schemas.microsoft.com/office/powerpoint/2010/main" val="1624220222"/>
+                <p14:modId xmlns:p14="http://schemas.microsoft.com/office/powerpoint/2010/main" val="3112404781"/>
               </p:ext>
             </p:extLst>
           </p:nvPr>
@@ -28988,7 +29019,7 @@
                           <a:ea typeface="Verdana" panose="020B0604030504040204" pitchFamily="34" charset="0"/>
                           <a:cs typeface="Verdana" panose="020B0604030504040204" pitchFamily="34" charset="0"/>
                         </a:rPr>
-                        <a:t>HGQA_V1.0_2015 Herramienta de Gestión QA-Producto</a:t>
+                        <a:t>HGQA Herramienta Gestión de Aseguramiento de Calidad</a:t>
                       </a:r>
                       <a:endParaRPr lang="es-ES" sz="1200" b="1" kern="1200" dirty="0" smtClean="0">
                         <a:solidFill>
@@ -29428,8 +29459,16 @@
                           <a:ea typeface="Verdana" panose="020B0604030504040204" pitchFamily="34" charset="0"/>
                           <a:cs typeface="Verdana" panose="020B0604030504040204" pitchFamily="34" charset="0"/>
                         </a:rPr>
-                        <a:t>HGQA_V1.0_2015 Herramienta de Gestión QA-Producto</a:t>
+                        <a:t>HGQA Herramienta Gestión de Aseguramiento de Calidad</a:t>
                       </a:r>
+                      <a:endParaRPr lang="es-ES" sz="1200" b="1" kern="1200" dirty="0" smtClean="0">
+                        <a:solidFill>
+                          <a:schemeClr val="dk1"/>
+                        </a:solidFill>
+                        <a:latin typeface="+mj-lt"/>
+                        <a:ea typeface="Verdana" panose="020B0604030504040204" pitchFamily="34" charset="0"/>
+                        <a:cs typeface="Verdana" panose="020B0604030504040204" pitchFamily="34" charset="0"/>
+                      </a:endParaRPr>
                     </a:p>
                   </a:txBody>
                   <a:tcPr marT="45718" marB="45718" horzOverflow="overflow">
@@ -29951,7 +29990,29 @@
                           <a:ea typeface="Verdana" panose="020B0604030504040204" pitchFamily="34" charset="0"/>
                           <a:cs typeface="Verdana" panose="020B0604030504040204" pitchFamily="34" charset="0"/>
                         </a:rPr>
-                        <a:t>CHKQA_V1.0_2015 Checklist de Aseguramiento de Calidad</a:t>
+                        <a:t>HGQA CheckList</a:t>
+                      </a:r>
+                      <a:r>
+                        <a:rPr lang="es-PE" sz="1200" b="1" kern="1200" baseline="0" dirty="0" smtClean="0">
+                          <a:solidFill>
+                            <a:schemeClr val="dk1"/>
+                          </a:solidFill>
+                          <a:latin typeface="+mj-lt"/>
+                          <a:ea typeface="Verdana" panose="020B0604030504040204" pitchFamily="34" charset="0"/>
+                          <a:cs typeface="Verdana" panose="020B0604030504040204" pitchFamily="34" charset="0"/>
+                        </a:rPr>
+                        <a:t> de</a:t>
+                      </a:r>
+                      <a:r>
+                        <a:rPr lang="es-PE" sz="1200" b="1" kern="1200" dirty="0" smtClean="0">
+                          <a:solidFill>
+                            <a:schemeClr val="dk1"/>
+                          </a:solidFill>
+                          <a:latin typeface="+mj-lt"/>
+                          <a:ea typeface="Verdana" panose="020B0604030504040204" pitchFamily="34" charset="0"/>
+                          <a:cs typeface="Verdana" panose="020B0604030504040204" pitchFamily="34" charset="0"/>
+                        </a:rPr>
+                        <a:t> Aseguramiento de Calidad</a:t>
                       </a:r>
                       <a:endParaRPr lang="es-ES" sz="1200" b="1" kern="1200" dirty="0" smtClean="0">
                         <a:solidFill>
@@ -30661,7 +30722,7 @@
             <a:fld id="{216C5678-EE20-4FA5-88E2-6E0BD67A2E26}" type="datetime1">
               <a:rPr lang="en-US" smtClean="0"/>
               <a:pPr/>
-              <a:t>10/19/2015</a:t>
+              <a:t>10/20/2015</a:t>
             </a:fld>
             <a:endParaRPr lang="en-US" dirty="0"/>
           </a:p>
@@ -30851,7 +30912,7 @@
           <a:p>
             <a:fld id="{216C5678-EE20-4FA5-88E2-6E0BD67A2E26}" type="datetime1">
               <a:rPr lang="en-US" smtClean="0"/>
-              <a:t>10/19/2015</a:t>
+              <a:t>10/20/2015</a:t>
             </a:fld>
             <a:endParaRPr lang="en-US" dirty="0"/>
           </a:p>
@@ -30902,9 +30963,10 @@
           <a:lstStyle/>
           <a:p>
             <a:r>
-              <a:rPr lang="en-US" dirty="0"/>
-              <a:t>PGPROY_V1.0_2015</a:t>
+              <a:rPr lang="en-US" dirty="0" smtClean="0"/>
+              <a:t>PQA_V1.0_2015</a:t>
             </a:r>
+            <a:endParaRPr lang="en-US" dirty="0"/>
           </a:p>
         </p:txBody>
       </p:sp>
@@ -32291,9 +32353,10 @@
           <a:lstStyle/>
           <a:p>
             <a:r>
-              <a:rPr lang="en-US" dirty="0"/>
-              <a:t>PGPROY_V1.0_2015</a:t>
+              <a:rPr lang="en-US" dirty="0" smtClean="0"/>
+              <a:t>PQA_V1.0_2015</a:t>
             </a:r>
+            <a:endParaRPr lang="en-US" dirty="0"/>
           </a:p>
         </p:txBody>
       </p:sp>
@@ -32452,7 +32515,7 @@
           <a:p>
             <a:fld id="{216C5678-EE20-4FA5-88E2-6E0BD67A2E26}" type="datetime1">
               <a:rPr lang="en-US" smtClean="0"/>
-              <a:t>10/19/2015</a:t>
+              <a:t>10/20/2015</a:t>
             </a:fld>
             <a:endParaRPr lang="en-US" dirty="0"/>
           </a:p>
@@ -32759,7 +32822,7 @@
           <a:p>
             <a:fld id="{216C5678-EE20-4FA5-88E2-6E0BD67A2E26}" type="datetime1">
               <a:rPr lang="en-US" smtClean="0"/>
-              <a:t>10/19/2015</a:t>
+              <a:t>10/20/2015</a:t>
             </a:fld>
             <a:endParaRPr lang="en-US" dirty="0"/>
           </a:p>
@@ -32949,7 +33012,7 @@
           <a:p>
             <a:fld id="{216C5678-EE20-4FA5-88E2-6E0BD67A2E26}" type="datetime1">
               <a:rPr lang="en-US" smtClean="0"/>
-              <a:t>10/19/2015</a:t>
+              <a:t>10/20/2015</a:t>
             </a:fld>
             <a:endParaRPr lang="en-US" dirty="0"/>
           </a:p>
@@ -33862,7 +33925,7 @@
           <a:p>
             <a:fld id="{216C5678-EE20-4FA5-88E2-6E0BD67A2E26}" type="datetime1">
               <a:rPr lang="en-US" smtClean="0"/>
-              <a:t>10/19/2015</a:t>
+              <a:t>10/20/2015</a:t>
             </a:fld>
             <a:endParaRPr lang="en-US" dirty="0"/>
           </a:p>
@@ -34025,7 +34088,7 @@
           <a:p>
             <a:fld id="{216C5678-EE20-4FA5-88E2-6E0BD67A2E26}" type="datetime1">
               <a:rPr lang="en-US" smtClean="0"/>
-              <a:t>10/19/2015</a:t>
+              <a:t>10/20/2015</a:t>
             </a:fld>
             <a:endParaRPr lang="en-US" dirty="0"/>
           </a:p>
@@ -34252,7 +34315,7 @@
           <a:p>
             <a:fld id="{216C5678-EE20-4FA5-88E2-6E0BD67A2E26}" type="datetime1">
               <a:rPr lang="en-US" smtClean="0"/>
-              <a:t>10/19/2015</a:t>
+              <a:t>10/20/2015</a:t>
             </a:fld>
             <a:endParaRPr lang="en-US" dirty="0"/>
           </a:p>

</xml_diff>